<commit_message>
updating with lecture notes
</commit_message>
<xml_diff>
--- a/lecture_15/machine_learning_slides.pptx
+++ b/lecture_15/machine_learning_slides.pptx
@@ -13180,7 +13180,7 @@
               <a:buNone/>
             </a:pPr>
             <a:r>
-              <a:rPr lang="en-US" dirty="0"/>
+              <a:rPr lang="en-US" b="1" dirty="0"/>
               <a:t>In the terminal, grab updated slides and lecture and install necessary software:</a:t>
             </a:r>
           </a:p>
@@ -13293,23 +13293,23 @@
               <a:buNone/>
             </a:pPr>
             <a:r>
-              <a:rPr lang="en-US" dirty="0"/>
+              <a:rPr lang="en-US" b="1" dirty="0"/>
               <a:t>In the </a:t>
             </a:r>
             <a:r>
-              <a:rPr lang="en-US" dirty="0" err="1"/>
+              <a:rPr lang="en-US" b="1" dirty="0" err="1"/>
               <a:t>jupyter</a:t>
             </a:r>
             <a:r>
-              <a:rPr lang="en-US" dirty="0"/>
+              <a:rPr lang="en-US" b="1" dirty="0"/>
               <a:t> notebook, download the dataset from </a:t>
             </a:r>
             <a:r>
-              <a:rPr lang="en-US" dirty="0" err="1"/>
+              <a:rPr lang="en-US" b="1" dirty="0" err="1"/>
               <a:t>cptac</a:t>
             </a:r>
             <a:r>
-              <a:rPr lang="en-US" dirty="0"/>
+              <a:rPr lang="en-US" b="1" dirty="0"/>
               <a:t>:</a:t>
             </a:r>
           </a:p>
@@ -13339,12 +13339,6 @@
               <a:rPr lang="en-US" dirty="0"/>
               <a:t>(dataset="endometrial")</a:t>
             </a:r>
-          </a:p>
-          <a:p>
-            <a:pPr marL="0" indent="0">
-              <a:buNone/>
-            </a:pPr>
-            <a:endParaRPr lang="en-US" dirty="0"/>
           </a:p>
         </p:txBody>
       </p:sp>
@@ -16214,15 +16208,7 @@
           <a:p>
             <a:r>
               <a:rPr lang="en-US" dirty="0"/>
-              <a:t>If you would like to learn more, Sackler runs </a:t>
-            </a:r>
-            <a:r>
-              <a:rPr lang="en-US"/>
-              <a:t>an excellent </a:t>
-            </a:r>
-            <a:r>
-              <a:rPr lang="en-US" dirty="0"/>
-              <a:t>Machine Learning course that is available at least to grad students. </a:t>
+              <a:t>If you would like to learn more, Sackler runs an excellent Machine Learning course that is available at least to grad students. </a:t>
             </a:r>
           </a:p>
           <a:p>
@@ -18531,26 +18517,35 @@
                                   </p:childTnLst>
                                 </p:cTn>
                               </p:par>
-                            </p:childTnLst>
-                          </p:cTn>
-                        </p:par>
-                      </p:childTnLst>
-                    </p:cTn>
-                  </p:par>
-                  <p:par>
-                    <p:cTn id="7" fill="hold">
-                      <p:stCondLst>
-                        <p:cond delay="indefinite"/>
-                      </p:stCondLst>
-                      <p:childTnLst>
-                        <p:par>
-                          <p:cTn id="8" fill="hold">
-                            <p:stCondLst>
-                              <p:cond delay="0"/>
-                            </p:stCondLst>
-                            <p:childTnLst>
                               <p:par>
-                                <p:cTn id="9" presetID="1" presetClass="entr" presetSubtype="0" fill="hold" nodeType="clickEffect">
+                                <p:cTn id="7" presetID="1" presetClass="entr" presetSubtype="0" fill="hold" nodeType="withEffect">
+                                  <p:stCondLst>
+                                    <p:cond delay="0"/>
+                                  </p:stCondLst>
+                                  <p:childTnLst>
+                                    <p:set>
+                                      <p:cBhvr>
+                                        <p:cTn id="8" dur="1" fill="hold">
+                                          <p:stCondLst>
+                                            <p:cond delay="0"/>
+                                          </p:stCondLst>
+                                        </p:cTn>
+                                        <p:tgtEl>
+                                          <p:spTgt spid="3"/>
+                                        </p:tgtEl>
+                                        <p:attrNameLst>
+                                          <p:attrName>style.visibility</p:attrName>
+                                        </p:attrNameLst>
+                                      </p:cBhvr>
+                                      <p:to>
+                                        <p:strVal val="visible"/>
+                                      </p:to>
+                                    </p:set>
+                                  </p:childTnLst>
+                                </p:cTn>
+                              </p:par>
+                              <p:par>
+                                <p:cTn id="9" presetID="1" presetClass="entr" presetSubtype="0" fill="hold" nodeType="withEffect">
                                   <p:stCondLst>
                                     <p:cond delay="0"/>
                                   </p:stCondLst>
@@ -18563,7 +18558,7 @@
                                           </p:stCondLst>
                                         </p:cTn>
                                         <p:tgtEl>
-                                          <p:spTgt spid="8"/>
+                                          <p:spTgt spid="14"/>
                                         </p:tgtEl>
                                         <p:attrNameLst>
                                           <p:attrName>style.visibility</p:attrName>
@@ -18590,7 +18585,7 @@
                                           </p:stCondLst>
                                         </p:cTn>
                                         <p:tgtEl>
-                                          <p:spTgt spid="3"/>
+                                          <p:spTgt spid="15"/>
                                         </p:tgtEl>
                                         <p:attrNameLst>
                                           <p:attrName>style.visibility</p:attrName>
@@ -18612,60 +18607,6 @@
                                     <p:set>
                                       <p:cBhvr>
                                         <p:cTn id="14" dur="1" fill="hold">
-                                          <p:stCondLst>
-                                            <p:cond delay="0"/>
-                                          </p:stCondLst>
-                                        </p:cTn>
-                                        <p:tgtEl>
-                                          <p:spTgt spid="14"/>
-                                        </p:tgtEl>
-                                        <p:attrNameLst>
-                                          <p:attrName>style.visibility</p:attrName>
-                                        </p:attrNameLst>
-                                      </p:cBhvr>
-                                      <p:to>
-                                        <p:strVal val="visible"/>
-                                      </p:to>
-                                    </p:set>
-                                  </p:childTnLst>
-                                </p:cTn>
-                              </p:par>
-                              <p:par>
-                                <p:cTn id="15" presetID="1" presetClass="entr" presetSubtype="0" fill="hold" nodeType="withEffect">
-                                  <p:stCondLst>
-                                    <p:cond delay="0"/>
-                                  </p:stCondLst>
-                                  <p:childTnLst>
-                                    <p:set>
-                                      <p:cBhvr>
-                                        <p:cTn id="16" dur="1" fill="hold">
-                                          <p:stCondLst>
-                                            <p:cond delay="0"/>
-                                          </p:stCondLst>
-                                        </p:cTn>
-                                        <p:tgtEl>
-                                          <p:spTgt spid="15"/>
-                                        </p:tgtEl>
-                                        <p:attrNameLst>
-                                          <p:attrName>style.visibility</p:attrName>
-                                        </p:attrNameLst>
-                                      </p:cBhvr>
-                                      <p:to>
-                                        <p:strVal val="visible"/>
-                                      </p:to>
-                                    </p:set>
-                                  </p:childTnLst>
-                                </p:cTn>
-                              </p:par>
-                              <p:par>
-                                <p:cTn id="17" presetID="1" presetClass="entr" presetSubtype="0" fill="hold" nodeType="withEffect">
-                                  <p:stCondLst>
-                                    <p:cond delay="0"/>
-                                  </p:stCondLst>
-                                  <p:childTnLst>
-                                    <p:set>
-                                      <p:cBhvr>
-                                        <p:cTn id="18" dur="1" fill="hold">
                                           <p:stCondLst>
                                             <p:cond delay="0"/>
                                           </p:stCondLst>

</xml_diff>